<commit_message>
Fix "Wicket in Action" date (Manning) from 2004 to 2008
</commit_message>
<xml_diff>
--- a/slides/Tag-1_3-Architektur.pptx
+++ b/slides/Tag-1_3-Architektur.pptx
@@ -6357,7 +6357,7 @@
               <a:pPr algn="ctr">
                 <a:defRPr/>
               </a:pPr>
-              <a:t>25.05.2021</a:t>
+              <a:t>26.05.2021</a:t>
             </a:fld>
             <a:endParaRPr lang="de-DE" sz="1000" dirty="0">
               <a:solidFill>
@@ -10615,8 +10615,17 @@
               <a:rPr lang="de-DE" sz="1400" dirty="0">
                 <a:latin typeface="+mj-lt"/>
               </a:rPr>
-              <a:t>, Manning 2004</a:t>
-            </a:r>
+              <a:t>, Manning </a:t>
+            </a:r>
+            <a:r>
+              <a:rPr lang="de-DE" sz="1400" dirty="0" smtClean="0">
+                <a:latin typeface="+mj-lt"/>
+              </a:rPr>
+              <a:t>2008</a:t>
+            </a:r>
+            <a:endParaRPr lang="de-DE" sz="1400" dirty="0">
+              <a:latin typeface="+mj-lt"/>
+            </a:endParaRPr>
           </a:p>
         </p:txBody>
       </p:sp>
@@ -10745,8 +10754,17 @@
               <a:rPr lang="de-DE" sz="1400" dirty="0">
                 <a:latin typeface="+mj-lt"/>
               </a:rPr>
-              <a:t>, Manning 2004</a:t>
-            </a:r>
+              <a:t>, Manning </a:t>
+            </a:r>
+            <a:r>
+              <a:rPr lang="de-DE" sz="1400" dirty="0" smtClean="0">
+                <a:latin typeface="+mj-lt"/>
+              </a:rPr>
+              <a:t>2008</a:t>
+            </a:r>
+            <a:endParaRPr lang="de-DE" sz="1400" dirty="0">
+              <a:latin typeface="+mj-lt"/>
+            </a:endParaRPr>
           </a:p>
         </p:txBody>
       </p:sp>
@@ -11894,8 +11912,13 @@
             </a:r>
             <a:r>
               <a:rPr lang="de-DE" dirty="0"/>
-              <a:t>, Manning 2004</a:t>
-            </a:r>
+              <a:t>, Manning </a:t>
+            </a:r>
+            <a:r>
+              <a:rPr lang="de-DE" dirty="0" smtClean="0"/>
+              <a:t>2008</a:t>
+            </a:r>
+            <a:endParaRPr lang="de-DE" dirty="0"/>
           </a:p>
         </p:txBody>
       </p:sp>
@@ -13142,8 +13165,17 @@
               <a:rPr lang="de-DE" sz="1400" dirty="0">
                 <a:latin typeface="+mj-lt"/>
               </a:rPr>
-              <a:t>, Manning 2004</a:t>
-            </a:r>
+              <a:t>, Manning </a:t>
+            </a:r>
+            <a:r>
+              <a:rPr lang="de-DE" sz="1400" dirty="0" smtClean="0">
+                <a:latin typeface="+mj-lt"/>
+              </a:rPr>
+              <a:t>2008</a:t>
+            </a:r>
+            <a:endParaRPr lang="de-DE" sz="1400" dirty="0">
+              <a:latin typeface="+mj-lt"/>
+            </a:endParaRPr>
           </a:p>
         </p:txBody>
       </p:sp>
@@ -14374,8 +14406,17 @@
               <a:rPr lang="de-DE" sz="1400" dirty="0">
                 <a:latin typeface="+mj-lt"/>
               </a:rPr>
-              <a:t>, Manning 2004</a:t>
-            </a:r>
+              <a:t>, Manning </a:t>
+            </a:r>
+            <a:r>
+              <a:rPr lang="de-DE" sz="1400" dirty="0" smtClean="0">
+                <a:latin typeface="+mj-lt"/>
+              </a:rPr>
+              <a:t>2008</a:t>
+            </a:r>
+            <a:endParaRPr lang="de-DE" sz="1400" dirty="0">
+              <a:latin typeface="+mj-lt"/>
+            </a:endParaRPr>
           </a:p>
         </p:txBody>
       </p:sp>
@@ -14506,8 +14547,17 @@
               <a:rPr lang="de-DE" sz="1400" dirty="0">
                 <a:latin typeface="+mj-lt"/>
               </a:rPr>
-              <a:t>, Manning 2004</a:t>
-            </a:r>
+              <a:t>, Manning </a:t>
+            </a:r>
+            <a:r>
+              <a:rPr lang="de-DE" sz="1400" dirty="0" smtClean="0">
+                <a:latin typeface="+mj-lt"/>
+              </a:rPr>
+              <a:t>2008</a:t>
+            </a:r>
+            <a:endParaRPr lang="de-DE" sz="1400" dirty="0">
+              <a:latin typeface="+mj-lt"/>
+            </a:endParaRPr>
           </a:p>
         </p:txBody>
       </p:sp>
@@ -14533,7 +14583,7 @@
           <a:graphicData uri="http://schemas.openxmlformats.org/presentationml/2006/ole">
             <mc:AlternateContent xmlns:mc="http://schemas.openxmlformats.org/markup-compatibility/2006">
               <mc:Choice xmlns:v="urn:schemas-microsoft-com:vml" Requires="v">
-                <p:oleObj spid="_x0000_s1097" name="Visio" r:id="rId3" imgW="2476804" imgH="4342874" progId="Visio.Drawing.11">
+                <p:oleObj spid="_x0000_s1098" name="Visio" r:id="rId3" imgW="2476804" imgH="4342874" progId="Visio.Drawing.11">
                   <p:embed/>
                 </p:oleObj>
               </mc:Choice>
@@ -15553,8 +15603,17 @@
               <a:rPr lang="de-DE" sz="1400" dirty="0">
                 <a:latin typeface="+mj-lt"/>
               </a:rPr>
-              <a:t>, Manning 2004</a:t>
-            </a:r>
+              <a:t>, Manning </a:t>
+            </a:r>
+            <a:r>
+              <a:rPr lang="de-DE" sz="1400" dirty="0" smtClean="0">
+                <a:latin typeface="+mj-lt"/>
+              </a:rPr>
+              <a:t>2008</a:t>
+            </a:r>
+            <a:endParaRPr lang="de-DE" sz="1400" dirty="0">
+              <a:latin typeface="+mj-lt"/>
+            </a:endParaRPr>
           </a:p>
         </p:txBody>
       </p:sp>

</xml_diff>